<commit_message>
Continuing merge. Pulling figures in.
</commit_message>
<xml_diff>
--- a/1161.cs330-social_graphs_and_semantic_analytics.pptx
+++ b/1161.cs330-social_graphs_and_semantic_analytics.pptx
@@ -7,20 +7,23 @@
   <p:sldIdLst>
     <p:sldId id="256" r:id="rId2"/>
     <p:sldId id="257" r:id="rId3"/>
-    <p:sldId id="258" r:id="rId4"/>
-    <p:sldId id="260" r:id="rId5"/>
+    <p:sldId id="260" r:id="rId4"/>
+    <p:sldId id="258" r:id="rId5"/>
     <p:sldId id="259" r:id="rId6"/>
     <p:sldId id="261" r:id="rId7"/>
-    <p:sldId id="264" r:id="rId8"/>
-    <p:sldId id="262" r:id="rId9"/>
-    <p:sldId id="263" r:id="rId10"/>
-    <p:sldId id="266" r:id="rId11"/>
-    <p:sldId id="265" r:id="rId12"/>
-    <p:sldId id="267" r:id="rId13"/>
-    <p:sldId id="268" r:id="rId14"/>
-    <p:sldId id="269" r:id="rId15"/>
-    <p:sldId id="270" r:id="rId16"/>
-    <p:sldId id="271" r:id="rId17"/>
+    <p:sldId id="273" r:id="rId8"/>
+    <p:sldId id="264" r:id="rId9"/>
+    <p:sldId id="262" r:id="rId10"/>
+    <p:sldId id="263" r:id="rId11"/>
+    <p:sldId id="274" r:id="rId12"/>
+    <p:sldId id="266" r:id="rId13"/>
+    <p:sldId id="265" r:id="rId14"/>
+    <p:sldId id="272" r:id="rId15"/>
+    <p:sldId id="267" r:id="rId16"/>
+    <p:sldId id="268" r:id="rId17"/>
+    <p:sldId id="269" r:id="rId18"/>
+    <p:sldId id="270" r:id="rId19"/>
+    <p:sldId id="271" r:id="rId20"/>
   </p:sldIdLst>
   <p:sldSz cx="9144000" cy="6858000" type="letter"/>
   <p:notesSz cx="6858000" cy="9144000"/>
@@ -3468,7 +3471,7 @@
           <a:p>
             <a:fld id="{0B42B3BC-4525-0549-9E37-8A994CE92E19}" type="datetimeFigureOut">
               <a:rPr lang="en-US" smtClean="0"/>
-              <a:t>3/20/16</a:t>
+              <a:t>3/21/16</a:t>
             </a:fld>
             <a:endParaRPr lang="en-US"/>
           </a:p>
@@ -3638,7 +3641,7 @@
           <a:p>
             <a:fld id="{0B42B3BC-4525-0549-9E37-8A994CE92E19}" type="datetimeFigureOut">
               <a:rPr lang="en-US" smtClean="0"/>
-              <a:t>3/20/16</a:t>
+              <a:t>3/21/16</a:t>
             </a:fld>
             <a:endParaRPr lang="en-US"/>
           </a:p>
@@ -3818,7 +3821,7 @@
           <a:p>
             <a:fld id="{0B42B3BC-4525-0549-9E37-8A994CE92E19}" type="datetimeFigureOut">
               <a:rPr lang="en-US" smtClean="0"/>
-              <a:t>3/20/16</a:t>
+              <a:t>3/21/16</a:t>
             </a:fld>
             <a:endParaRPr lang="en-US"/>
           </a:p>
@@ -3988,7 +3991,7 @@
           <a:p>
             <a:fld id="{0B42B3BC-4525-0549-9E37-8A994CE92E19}" type="datetimeFigureOut">
               <a:rPr lang="en-US" smtClean="0"/>
-              <a:t>3/20/16</a:t>
+              <a:t>3/21/16</a:t>
             </a:fld>
             <a:endParaRPr lang="en-US"/>
           </a:p>
@@ -4232,7 +4235,7 @@
           <a:p>
             <a:fld id="{0B42B3BC-4525-0549-9E37-8A994CE92E19}" type="datetimeFigureOut">
               <a:rPr lang="en-US" smtClean="0"/>
-              <a:t>3/20/16</a:t>
+              <a:t>3/21/16</a:t>
             </a:fld>
             <a:endParaRPr lang="en-US"/>
           </a:p>
@@ -4464,7 +4467,7 @@
           <a:p>
             <a:fld id="{0B42B3BC-4525-0549-9E37-8A994CE92E19}" type="datetimeFigureOut">
               <a:rPr lang="en-US" smtClean="0"/>
-              <a:t>3/20/16</a:t>
+              <a:t>3/21/16</a:t>
             </a:fld>
             <a:endParaRPr lang="en-US"/>
           </a:p>
@@ -4831,7 +4834,7 @@
           <a:p>
             <a:fld id="{0B42B3BC-4525-0549-9E37-8A994CE92E19}" type="datetimeFigureOut">
               <a:rPr lang="en-US" smtClean="0"/>
-              <a:t>3/20/16</a:t>
+              <a:t>3/21/16</a:t>
             </a:fld>
             <a:endParaRPr lang="en-US"/>
           </a:p>
@@ -4949,7 +4952,7 @@
           <a:p>
             <a:fld id="{0B42B3BC-4525-0549-9E37-8A994CE92E19}" type="datetimeFigureOut">
               <a:rPr lang="en-US" smtClean="0"/>
-              <a:t>3/20/16</a:t>
+              <a:t>3/21/16</a:t>
             </a:fld>
             <a:endParaRPr lang="en-US"/>
           </a:p>
@@ -5044,7 +5047,7 @@
           <a:p>
             <a:fld id="{0B42B3BC-4525-0549-9E37-8A994CE92E19}" type="datetimeFigureOut">
               <a:rPr lang="en-US" smtClean="0"/>
-              <a:t>3/20/16</a:t>
+              <a:t>3/21/16</a:t>
             </a:fld>
             <a:endParaRPr lang="en-US"/>
           </a:p>
@@ -5321,7 +5324,7 @@
           <a:p>
             <a:fld id="{0B42B3BC-4525-0549-9E37-8A994CE92E19}" type="datetimeFigureOut">
               <a:rPr lang="en-US" smtClean="0"/>
-              <a:t>3/20/16</a:t>
+              <a:t>3/21/16</a:t>
             </a:fld>
             <a:endParaRPr lang="en-US"/>
           </a:p>
@@ -5578,7 +5581,7 @@
           <a:p>
             <a:fld id="{0B42B3BC-4525-0549-9E37-8A994CE92E19}" type="datetimeFigureOut">
               <a:rPr lang="en-US" smtClean="0"/>
-              <a:t>3/20/16</a:t>
+              <a:t>3/21/16</a:t>
             </a:fld>
             <a:endParaRPr lang="en-US"/>
           </a:p>
@@ -5791,7 +5794,7 @@
           <a:p>
             <a:fld id="{0B42B3BC-4525-0549-9E37-8A994CE92E19}" type="datetimeFigureOut">
               <a:rPr lang="en-US" smtClean="0"/>
-              <a:t>3/20/16</a:t>
+              <a:t>3/21/16</a:t>
             </a:fld>
             <a:endParaRPr lang="en-US"/>
           </a:p>
@@ -6315,18 +6318,7 @@
                 </a:solidFill>
                 <a:effectLst/>
               </a:rPr>
-              <a:t>Prepared guest lecture for Class 11 of W16 </a:t>
-            </a:r>
-            <a:r>
-              <a:rPr lang="en-US" dirty="0" smtClean="0">
-                <a:solidFill>
-                  <a:schemeClr val="accent6">
-                    <a:lumMod val="50000"/>
-                  </a:schemeClr>
-                </a:solidFill>
-                <a:effectLst/>
-              </a:rPr>
-              <a:t>cs330.</a:t>
+              <a:t>Prepared guest lecture for Class 11 of W16 cs330.</a:t>
             </a:r>
             <a:endParaRPr lang="en-US" dirty="0">
               <a:solidFill>
@@ -6393,41 +6385,103 @@
           <a:p>
             <a:r>
               <a:rPr lang="en-US" dirty="0" smtClean="0"/>
-              <a:t>Web 2.0: URLs</a:t>
+              <a:t>Web 2.0: </a:t>
+            </a:r>
+            <a:r>
+              <a:rPr lang="en-US" dirty="0" smtClean="0"/>
+              <a:t>HTTP</a:t>
             </a:r>
             <a:endParaRPr lang="en-US" dirty="0"/>
           </a:p>
         </p:txBody>
       </p:sp>
-      <p:sp>
-        <p:nvSpPr>
-          <p:cNvPr id="3" name="Content Placeholder 2"/>
-          <p:cNvSpPr>
-            <a:spLocks noGrp="1"/>
-          </p:cNvSpPr>
-          <p:nvPr>
-            <p:ph idx="1"/>
-          </p:nvPr>
-        </p:nvSpPr>
-        <p:spPr/>
-        <p:txBody>
-          <a:bodyPr/>
+      <p:pic>
+        <p:nvPicPr>
+          <p:cNvPr id="9" name="Picture 8"/>
+          <p:cNvPicPr>
+            <a:picLocks noChangeAspect="1"/>
+          </p:cNvPicPr>
+          <p:nvPr/>
+        </p:nvPicPr>
+        <p:blipFill>
+          <a:blip r:embed="rId2"/>
+          <a:stretch>
+            <a:fillRect/>
+          </a:stretch>
+        </p:blipFill>
+        <p:spPr>
+          <a:xfrm>
+            <a:off x="1300775" y="1690689"/>
+            <a:ext cx="6542449" cy="4680000"/>
+          </a:xfrm>
+          <a:prstGeom prst="rect">
+            <a:avLst/>
+          </a:prstGeom>
+        </p:spPr>
+      </p:pic>
+      <p:sp>
+        <p:nvSpPr>
+          <p:cNvPr id="10" name="TextBox 9"/>
+          <p:cNvSpPr txBox="1"/>
+          <p:nvPr/>
+        </p:nvSpPr>
+        <p:spPr>
+          <a:xfrm>
+            <a:off x="4757981" y="704742"/>
+            <a:ext cx="3998562" cy="646331"/>
+          </a:xfrm>
+          <a:prstGeom prst="rect">
+            <a:avLst/>
+          </a:prstGeom>
+          <a:noFill/>
+        </p:spPr>
+        <p:txBody>
+          <a:bodyPr wrap="square" rtlCol="0">
+            <a:spAutoFit/>
+          </a:bodyPr>
           <a:lstStyle/>
           <a:p>
-            <a:endParaRPr lang="en-US"/>
+            <a:r>
+              <a:rPr lang="en-US" dirty="0"/>
+              <a:t>See: </a:t>
+            </a:r>
+            <a:r>
+              <a:rPr lang="en-US" dirty="0">
+                <a:hlinkClick r:id="rId3"/>
+              </a:rPr>
+              <a:t>https://</a:t>
+            </a:r>
+            <a:r>
+              <a:rPr lang="en-US" dirty="0" smtClean="0">
+                <a:hlinkClick r:id="rId3"/>
+              </a:rPr>
+              <a:t>tools.ietf.org/pdf/rfc7231.pdf</a:t>
+            </a:r>
+            <a:r>
+              <a:rPr lang="en-US" dirty="0" smtClean="0"/>
+              <a:t> </a:t>
+            </a:r>
+            <a:endParaRPr lang="en-US" dirty="0"/>
           </a:p>
         </p:txBody>
       </p:sp>
     </p:spTree>
     <p:extLst>
       <p:ext uri="{BB962C8B-B14F-4D97-AF65-F5344CB8AC3E}">
-        <p14:creationId xmlns:p14="http://schemas.microsoft.com/office/powerpoint/2010/main" val="389905828"/>
+        <p14:creationId xmlns:p14="http://schemas.microsoft.com/office/powerpoint/2010/main" val="1437677408"/>
       </p:ext>
     </p:extLst>
   </p:cSld>
   <p:clrMapOvr>
     <a:masterClrMapping/>
   </p:clrMapOvr>
+  <p:timing>
+    <p:tnLst>
+      <p:par>
+        <p:cTn id="1" dur="indefinite" restart="never" nodeType="tmRoot"/>
+      </p:par>
+    </p:tnLst>
+  </p:timing>
 </p:sld>
 </file>
 
@@ -6448,6 +6502,30 @@
           <a:chExt cx="0" cy="0"/>
         </a:xfrm>
       </p:grpSpPr>
+      <p:pic>
+        <p:nvPicPr>
+          <p:cNvPr id="3" name="Picture 2"/>
+          <p:cNvPicPr>
+            <a:picLocks noChangeAspect="1"/>
+          </p:cNvPicPr>
+          <p:nvPr/>
+        </p:nvPicPr>
+        <p:blipFill>
+          <a:blip r:embed="rId2"/>
+          <a:stretch>
+            <a:fillRect/>
+          </a:stretch>
+        </p:blipFill>
+        <p:spPr>
+          <a:xfrm>
+            <a:off x="1300775" y="1690689"/>
+            <a:ext cx="6542449" cy="4680000"/>
+          </a:xfrm>
+          <a:prstGeom prst="rect">
+            <a:avLst/>
+          </a:prstGeom>
+        </p:spPr>
+      </p:pic>
       <p:sp>
         <p:nvSpPr>
           <p:cNvPr id="2" name="Title 1"/>
@@ -6465,7 +6543,11 @@
           <a:p>
             <a:r>
               <a:rPr lang="en-US" dirty="0" smtClean="0"/>
-              <a:t>Web 2.0: HTML w/ (JS + CSS)</a:t>
+              <a:t>Web 2.0: </a:t>
+            </a:r>
+            <a:r>
+              <a:rPr lang="en-US" dirty="0" smtClean="0"/>
+              <a:t>HTTP</a:t>
             </a:r>
             <a:endParaRPr lang="en-US" dirty="0"/>
           </a:p>
@@ -6473,33 +6555,67 @@
       </p:sp>
       <p:sp>
         <p:nvSpPr>
-          <p:cNvPr id="3" name="Content Placeholder 2"/>
-          <p:cNvSpPr>
-            <a:spLocks noGrp="1"/>
-          </p:cNvSpPr>
-          <p:nvPr>
-            <p:ph idx="1"/>
-          </p:nvPr>
-        </p:nvSpPr>
-        <p:spPr/>
-        <p:txBody>
-          <a:bodyPr/>
+          <p:cNvPr id="5" name="TextBox 4"/>
+          <p:cNvSpPr txBox="1"/>
+          <p:nvPr/>
+        </p:nvSpPr>
+        <p:spPr>
+          <a:xfrm>
+            <a:off x="4757981" y="704742"/>
+            <a:ext cx="3998562" cy="646331"/>
+          </a:xfrm>
+          <a:prstGeom prst="rect">
+            <a:avLst/>
+          </a:prstGeom>
+          <a:noFill/>
+        </p:spPr>
+        <p:txBody>
+          <a:bodyPr wrap="square" rtlCol="0">
+            <a:spAutoFit/>
+          </a:bodyPr>
           <a:lstStyle/>
           <a:p>
-            <a:endParaRPr lang="en-US"/>
+            <a:r>
+              <a:rPr lang="en-US" dirty="0"/>
+              <a:t>See: </a:t>
+            </a:r>
+            <a:r>
+              <a:rPr lang="en-US" dirty="0">
+                <a:hlinkClick r:id="rId3"/>
+              </a:rPr>
+              <a:t>https://</a:t>
+            </a:r>
+            <a:r>
+              <a:rPr lang="en-US" dirty="0" smtClean="0">
+                <a:hlinkClick r:id="rId3"/>
+              </a:rPr>
+              <a:t>tools.ietf.org/pdf/rfc7231.pdf</a:t>
+            </a:r>
+            <a:r>
+              <a:rPr lang="en-US" dirty="0" smtClean="0"/>
+              <a:t> </a:t>
+            </a:r>
+            <a:endParaRPr lang="en-US" dirty="0"/>
           </a:p>
         </p:txBody>
       </p:sp>
     </p:spTree>
     <p:extLst>
       <p:ext uri="{BB962C8B-B14F-4D97-AF65-F5344CB8AC3E}">
-        <p14:creationId xmlns:p14="http://schemas.microsoft.com/office/powerpoint/2010/main" val="400762058"/>
+        <p14:creationId xmlns:p14="http://schemas.microsoft.com/office/powerpoint/2010/main" val="489737991"/>
       </p:ext>
     </p:extLst>
   </p:cSld>
   <p:clrMapOvr>
     <a:masterClrMapping/>
   </p:clrMapOvr>
+  <p:timing>
+    <p:tnLst>
+      <p:par>
+        <p:cTn id="1" dur="indefinite" restart="never" nodeType="tmRoot"/>
+      </p:par>
+    </p:tnLst>
+  </p:timing>
 </p:sld>
 </file>
 
@@ -6537,7 +6653,11 @@
           <a:p>
             <a:r>
               <a:rPr lang="en-US" dirty="0" smtClean="0"/>
-              <a:t>Web 2.0: XML</a:t>
+              <a:t>Web 2.0: </a:t>
+            </a:r>
+            <a:r>
+              <a:rPr lang="en-US" dirty="0" smtClean="0"/>
+              <a:t>URLs / URIs</a:t>
             </a:r>
             <a:endParaRPr lang="en-US" dirty="0"/>
           </a:p>
@@ -6555,23 +6675,231 @@
         </p:nvSpPr>
         <p:spPr/>
         <p:txBody>
-          <a:bodyPr/>
+          <a:bodyPr>
+            <a:normAutofit/>
+          </a:bodyPr>
           <a:lstStyle/>
           <a:p>
-            <a:endParaRPr lang="en-US"/>
+            <a:r>
+              <a:rPr lang="en-US" dirty="0" smtClean="0"/>
+              <a:t>A Uniform Resource Locator (URL) </a:t>
+            </a:r>
+            <a:r>
+              <a:rPr lang="en-US" dirty="0" smtClean="0"/>
+              <a:t>is </a:t>
+            </a:r>
+            <a:r>
+              <a:rPr lang="en-US" dirty="0" smtClean="0"/>
+              <a:t>a specific class of Uniform Resource Identifier (URIs)</a:t>
+            </a:r>
+          </a:p>
+          <a:p>
+            <a:pPr lvl="1"/>
+            <a:r>
+              <a:rPr lang="en-US" smtClean="0"/>
+              <a:t>See: </a:t>
+            </a:r>
+            <a:r>
+              <a:rPr lang="en-US" smtClean="0">
+                <a:hlinkClick r:id="rId2"/>
+              </a:rPr>
+              <a:t>https</a:t>
+            </a:r>
+            <a:r>
+              <a:rPr lang="en-US" dirty="0">
+                <a:hlinkClick r:id="rId2"/>
+              </a:rPr>
+              <a:t>://</a:t>
+            </a:r>
+            <a:r>
+              <a:rPr lang="en-US" dirty="0" smtClean="0">
+                <a:hlinkClick r:id="rId2"/>
+              </a:rPr>
+              <a:t>www.ietf.org/rfc/rfc3986.txt</a:t>
+            </a:r>
+            <a:endParaRPr lang="en-US" dirty="0" smtClean="0"/>
+          </a:p>
+          <a:p>
+            <a:r>
+              <a:rPr lang="en-US" dirty="0" smtClean="0"/>
+              <a:t>The standardized structure of a string to allow items to be uniquely identified (URI).  Sometimes items are best identified by its location (URL).</a:t>
+            </a:r>
+            <a:endParaRPr lang="en-US" dirty="0"/>
+          </a:p>
+          <a:p>
+            <a:r>
+              <a:rPr lang="en-US" dirty="0" smtClean="0"/>
+              <a:t>Pattern:</a:t>
+            </a:r>
+          </a:p>
+          <a:p>
+            <a:pPr lvl="1"/>
+            <a:endParaRPr lang="en-US" dirty="0">
+              <a:latin typeface="Andale Mono" charset="0"/>
+              <a:ea typeface="Andale Mono" charset="0"/>
+              <a:cs typeface="Andale Mono" charset="0"/>
+            </a:endParaRPr>
+          </a:p>
+          <a:p>
+            <a:pPr lvl="1"/>
+            <a:endParaRPr lang="en-US" dirty="0" smtClean="0"/>
+          </a:p>
+        </p:txBody>
+      </p:sp>
+      <p:sp>
+        <p:nvSpPr>
+          <p:cNvPr id="4" name="TextBox 3"/>
+          <p:cNvSpPr txBox="1"/>
+          <p:nvPr/>
+        </p:nvSpPr>
+        <p:spPr>
+          <a:xfrm>
+            <a:off x="1039660" y="4872625"/>
+            <a:ext cx="7202466" cy="1200329"/>
+          </a:xfrm>
+          <a:prstGeom prst="rect">
+            <a:avLst/>
+          </a:prstGeom>
+          <a:noFill/>
+        </p:spPr>
+        <p:txBody>
+          <a:bodyPr wrap="square" rtlCol="0">
+            <a:spAutoFit/>
+          </a:bodyPr>
+          <a:lstStyle/>
+          <a:p>
+            <a:r>
+              <a:rPr lang="en-US" dirty="0">
+                <a:latin typeface="Courier" charset="0"/>
+                <a:ea typeface="Courier" charset="0"/>
+                <a:cs typeface="Courier" charset="0"/>
+              </a:rPr>
+              <a:t>foo://example.com:8042/over/</a:t>
+            </a:r>
+            <a:r>
+              <a:rPr lang="en-US" dirty="0" err="1">
+                <a:latin typeface="Courier" charset="0"/>
+                <a:ea typeface="Courier" charset="0"/>
+                <a:cs typeface="Courier" charset="0"/>
+              </a:rPr>
+              <a:t>there?name</a:t>
+            </a:r>
+            <a:r>
+              <a:rPr lang="en-US" dirty="0">
+                <a:latin typeface="Courier" charset="0"/>
+                <a:ea typeface="Courier" charset="0"/>
+                <a:cs typeface="Courier" charset="0"/>
+              </a:rPr>
+              <a:t>=</a:t>
+            </a:r>
+            <a:r>
+              <a:rPr lang="en-US" dirty="0" err="1">
+                <a:latin typeface="Courier" charset="0"/>
+                <a:ea typeface="Courier" charset="0"/>
+                <a:cs typeface="Courier" charset="0"/>
+              </a:rPr>
+              <a:t>ferret#nose</a:t>
+            </a:r>
+            <a:r>
+              <a:rPr lang="en-US" dirty="0">
+                <a:latin typeface="Courier" charset="0"/>
+                <a:ea typeface="Courier" charset="0"/>
+                <a:cs typeface="Courier" charset="0"/>
+              </a:rPr>
+              <a:t> \_/ </a:t>
+            </a:r>
+            <a:r>
+              <a:rPr lang="en-US" dirty="0" smtClean="0">
+                <a:latin typeface="Courier" charset="0"/>
+                <a:ea typeface="Courier" charset="0"/>
+                <a:cs typeface="Courier" charset="0"/>
+              </a:rPr>
+              <a:t>  \______________/\_________/ \_________/ \__/</a:t>
+            </a:r>
+          </a:p>
+          <a:p>
+            <a:r>
+              <a:rPr lang="en-US" dirty="0">
+                <a:latin typeface="Courier" charset="0"/>
+                <a:ea typeface="Courier" charset="0"/>
+                <a:cs typeface="Courier" charset="0"/>
+              </a:rPr>
+              <a:t> </a:t>
+            </a:r>
+            <a:r>
+              <a:rPr lang="en-US" dirty="0" smtClean="0">
+                <a:latin typeface="Courier" charset="0"/>
+                <a:ea typeface="Courier" charset="0"/>
+                <a:cs typeface="Courier" charset="0"/>
+              </a:rPr>
+              <a:t>|         |            |            |         |</a:t>
+            </a:r>
+          </a:p>
+          <a:p>
+            <a:r>
+              <a:rPr lang="en-US" dirty="0" smtClean="0">
+                <a:latin typeface="Courier" charset="0"/>
+                <a:ea typeface="Courier" charset="0"/>
+                <a:cs typeface="Courier" charset="0"/>
+              </a:rPr>
+              <a:t>scheme  authority      path        query   fragment</a:t>
+            </a:r>
+            <a:endParaRPr lang="en-US" dirty="0">
+              <a:latin typeface="Courier" charset="0"/>
+              <a:ea typeface="Courier" charset="0"/>
+              <a:cs typeface="Courier" charset="0"/>
+            </a:endParaRPr>
+          </a:p>
+        </p:txBody>
+      </p:sp>
+      <p:sp>
+        <p:nvSpPr>
+          <p:cNvPr id="6" name="TextBox 5"/>
+          <p:cNvSpPr txBox="1"/>
+          <p:nvPr/>
+        </p:nvSpPr>
+        <p:spPr>
+          <a:xfrm>
+            <a:off x="5298510" y="6301004"/>
+            <a:ext cx="2943616" cy="369332"/>
+          </a:xfrm>
+          <a:prstGeom prst="rect">
+            <a:avLst/>
+          </a:prstGeom>
+          <a:noFill/>
+        </p:spPr>
+        <p:txBody>
+          <a:bodyPr wrap="square" rtlCol="0">
+            <a:spAutoFit/>
+          </a:bodyPr>
+          <a:lstStyle/>
+          <a:p>
+            <a:pPr algn="r"/>
+            <a:r>
+              <a:rPr lang="en-US" dirty="0" smtClean="0"/>
+              <a:t>Example from IETF RFC3986</a:t>
+            </a:r>
+            <a:endParaRPr lang="en-US" dirty="0"/>
           </a:p>
         </p:txBody>
       </p:sp>
     </p:spTree>
     <p:extLst>
       <p:ext uri="{BB962C8B-B14F-4D97-AF65-F5344CB8AC3E}">
-        <p14:creationId xmlns:p14="http://schemas.microsoft.com/office/powerpoint/2010/main" val="1461253917"/>
+        <p14:creationId xmlns:p14="http://schemas.microsoft.com/office/powerpoint/2010/main" val="389905828"/>
       </p:ext>
     </p:extLst>
   </p:cSld>
   <p:clrMapOvr>
     <a:masterClrMapping/>
   </p:clrMapOvr>
+  <p:timing>
+    <p:tnLst>
+      <p:par>
+        <p:cTn id="1" dur="indefinite" restart="never" nodeType="tmRoot"/>
+      </p:par>
+    </p:tnLst>
+  </p:timing>
 </p:sld>
 </file>
 
@@ -6609,7 +6937,7 @@
           <a:p>
             <a:r>
               <a:rPr lang="en-US" dirty="0" smtClean="0"/>
-              <a:t>Web 2.0: Web Services</a:t>
+              <a:t>Web 2.0: HTML w/ (JS + CSS)</a:t>
             </a:r>
             <a:endParaRPr lang="en-US" dirty="0"/>
           </a:p>
@@ -6630,20 +6958,118 @@
           <a:bodyPr/>
           <a:lstStyle/>
           <a:p>
-            <a:endParaRPr lang="en-US"/>
+            <a:r>
+              <a:rPr lang="en-US" dirty="0" smtClean="0"/>
+              <a:t>Hypertext Markup Language (HTML)</a:t>
+            </a:r>
+          </a:p>
+          <a:p>
+            <a:pPr lvl="1"/>
+            <a:r>
+              <a:rPr lang="en-US" dirty="0" smtClean="0"/>
+              <a:t>See: </a:t>
+            </a:r>
+            <a:r>
+              <a:rPr lang="en-US" dirty="0" smtClean="0">
+                <a:hlinkClick r:id="rId2"/>
+              </a:rPr>
+              <a:t>https</a:t>
+            </a:r>
+            <a:r>
+              <a:rPr lang="en-US" dirty="0">
+                <a:hlinkClick r:id="rId2"/>
+              </a:rPr>
+              <a:t>://</a:t>
+            </a:r>
+            <a:r>
+              <a:rPr lang="en-US" dirty="0" smtClean="0">
+                <a:hlinkClick r:id="rId2"/>
+              </a:rPr>
+              <a:t>www.w3.org/TR/html5/</a:t>
+            </a:r>
+            <a:endParaRPr lang="en-US" dirty="0"/>
+          </a:p>
+          <a:p>
+            <a:r>
+              <a:rPr lang="en-US" dirty="0" smtClean="0"/>
+              <a:t>Most modern websites include JavaScript (JS) to allow for ‘dynamic’ interactions.</a:t>
+            </a:r>
+          </a:p>
+          <a:p>
+            <a:pPr lvl="1"/>
+            <a:r>
+              <a:rPr lang="en-US" dirty="0" smtClean="0"/>
+              <a:t>See: </a:t>
+            </a:r>
+            <a:r>
+              <a:rPr lang="en-US" dirty="0" smtClean="0">
+                <a:hlinkClick r:id="rId3"/>
+              </a:rPr>
+              <a:t>http</a:t>
+            </a:r>
+            <a:r>
+              <a:rPr lang="en-US" dirty="0">
+                <a:hlinkClick r:id="rId3"/>
+              </a:rPr>
+              <a:t>://www.ecma-international.org/ecma-262/5.1</a:t>
+            </a:r>
+            <a:r>
+              <a:rPr lang="en-US" dirty="0" smtClean="0">
+                <a:hlinkClick r:id="rId3"/>
+              </a:rPr>
+              <a:t>/</a:t>
+            </a:r>
+            <a:endParaRPr lang="en-US" dirty="0" smtClean="0"/>
+          </a:p>
+          <a:p>
+            <a:r>
+              <a:rPr lang="en-US" dirty="0" smtClean="0"/>
+              <a:t>Data (HTML) and dynamic logic (JavaScript) is separated from visual presentation using Cascading Style Sheets (CSS). </a:t>
+            </a:r>
+          </a:p>
+          <a:p>
+            <a:pPr lvl="1"/>
+            <a:r>
+              <a:rPr lang="en-US" dirty="0" smtClean="0"/>
+              <a:t>See</a:t>
+            </a:r>
+            <a:r>
+              <a:rPr lang="en-US" dirty="0"/>
+              <a:t>: </a:t>
+            </a:r>
+            <a:r>
+              <a:rPr lang="en-US" dirty="0">
+                <a:hlinkClick r:id="rId4"/>
+              </a:rPr>
+              <a:t>https://www.w3.org/TR/CSS</a:t>
+            </a:r>
+            <a:r>
+              <a:rPr lang="en-US" dirty="0" smtClean="0">
+                <a:hlinkClick r:id="rId4"/>
+              </a:rPr>
+              <a:t>/</a:t>
+            </a:r>
+            <a:endParaRPr lang="en-US" dirty="0" smtClean="0"/>
           </a:p>
         </p:txBody>
       </p:sp>
     </p:spTree>
     <p:extLst>
       <p:ext uri="{BB962C8B-B14F-4D97-AF65-F5344CB8AC3E}">
-        <p14:creationId xmlns:p14="http://schemas.microsoft.com/office/powerpoint/2010/main" val="1620994905"/>
+        <p14:creationId xmlns:p14="http://schemas.microsoft.com/office/powerpoint/2010/main" val="400762058"/>
       </p:ext>
     </p:extLst>
   </p:cSld>
   <p:clrMapOvr>
     <a:masterClrMapping/>
   </p:clrMapOvr>
+  <p:timing>
+    <p:tnLst>
+      <p:par>
+        <p:cTn id="1" dur="indefinite" restart="never" nodeType="tmRoot"/>
+      </p:par>
+    </p:tnLst>
+  </p:timing>
 </p:sld>
 </file>
 
@@ -6681,7 +7107,7 @@
           <a:p>
             <a:r>
               <a:rPr lang="en-US" dirty="0" smtClean="0"/>
-              <a:t>Web 2.0: SOAP</a:t>
+              <a:t>Web 2.0: WWW</a:t>
             </a:r>
             <a:endParaRPr lang="en-US" dirty="0"/>
           </a:p>
@@ -6689,7 +7115,7 @@
       </p:sp>
       <p:sp>
         <p:nvSpPr>
-          <p:cNvPr id="3" name="Content Placeholder 2"/>
+          <p:cNvPr id="9" name="Content Placeholder 8"/>
           <p:cNvSpPr>
             <a:spLocks noGrp="1"/>
           </p:cNvSpPr>
@@ -6697,25 +7123,176 @@
             <p:ph idx="1"/>
           </p:nvPr>
         </p:nvSpPr>
-        <p:spPr/>
+        <p:spPr>
+          <a:xfrm>
+            <a:off x="628650" y="1363851"/>
+            <a:ext cx="4076700" cy="4813112"/>
+          </a:xfrm>
+        </p:spPr>
         <p:txBody>
           <a:bodyPr/>
           <a:lstStyle/>
           <a:p>
-            <a:endParaRPr lang="en-US"/>
+            <a:endParaRPr lang="en-US" dirty="0"/>
+          </a:p>
+        </p:txBody>
+      </p:sp>
+      <p:pic>
+        <p:nvPicPr>
+          <p:cNvPr id="5" name="Picture 4"/>
+          <p:cNvPicPr>
+            <a:picLocks noChangeAspect="1"/>
+          </p:cNvPicPr>
+          <p:nvPr/>
+        </p:nvPicPr>
+        <p:blipFill>
+          <a:blip r:embed="rId2">
+            <a:extLst>
+              <a:ext uri="{28A0092B-C50C-407E-A947-70E740481C1C}">
+                <a14:useLocalDpi xmlns:a14="http://schemas.microsoft.com/office/drawing/2010/main" val="0"/>
+              </a:ext>
+            </a:extLst>
+          </a:blip>
+          <a:stretch>
+            <a:fillRect/>
+          </a:stretch>
+        </p:blipFill>
+        <p:spPr>
+          <a:xfrm>
+            <a:off x="4821265" y="365126"/>
+            <a:ext cx="3810000" cy="4629150"/>
+          </a:xfrm>
+          <a:prstGeom prst="rect">
+            <a:avLst/>
+          </a:prstGeom>
+        </p:spPr>
+      </p:pic>
+      <p:sp>
+        <p:nvSpPr>
+          <p:cNvPr id="6" name="TextBox 5"/>
+          <p:cNvSpPr txBox="1"/>
+          <p:nvPr/>
+        </p:nvSpPr>
+        <p:spPr>
+          <a:xfrm>
+            <a:off x="4705350" y="4671110"/>
+            <a:ext cx="3810000" cy="646331"/>
+          </a:xfrm>
+          <a:prstGeom prst="rect">
+            <a:avLst/>
+          </a:prstGeom>
+          <a:noFill/>
+        </p:spPr>
+        <p:txBody>
+          <a:bodyPr wrap="square" rtlCol="0">
+            <a:spAutoFit/>
+          </a:bodyPr>
+          <a:lstStyle/>
+          <a:p>
+            <a:pPr algn="r"/>
+            <a:r>
+              <a:rPr lang="en-US" dirty="0" smtClean="0">
+                <a:solidFill>
+                  <a:schemeClr val="bg1"/>
+                </a:solidFill>
+              </a:rPr>
+              <a:t>”Graph of World Wide Web” source</a:t>
+            </a:r>
+            <a:r>
+              <a:rPr lang="en-US" dirty="0">
+                <a:solidFill>
+                  <a:schemeClr val="bg1"/>
+                </a:solidFill>
+              </a:rPr>
+              <a:t>: </a:t>
+            </a:r>
+            <a:r>
+              <a:rPr lang="en-US" dirty="0">
+                <a:hlinkClick r:id="rId3"/>
+              </a:rPr>
+              <a:t>http://www.bordalierinstitute.com</a:t>
+            </a:r>
+            <a:r>
+              <a:rPr lang="en-US" dirty="0" smtClean="0">
+                <a:hlinkClick r:id="rId3"/>
+              </a:rPr>
+              <a:t>/</a:t>
+            </a:r>
+            <a:endParaRPr lang="en-US" dirty="0" smtClean="0"/>
+          </a:p>
+        </p:txBody>
+      </p:sp>
+      <p:sp>
+        <p:nvSpPr>
+          <p:cNvPr id="10" name="TextBox 9"/>
+          <p:cNvSpPr txBox="1"/>
+          <p:nvPr/>
+        </p:nvSpPr>
+        <p:spPr>
+          <a:xfrm>
+            <a:off x="4821265" y="5501898"/>
+            <a:ext cx="3810000" cy="646331"/>
+          </a:xfrm>
+          <a:prstGeom prst="rect">
+            <a:avLst/>
+          </a:prstGeom>
+          <a:noFill/>
+        </p:spPr>
+        <p:txBody>
+          <a:bodyPr wrap="square" rtlCol="0">
+            <a:spAutoFit/>
+          </a:bodyPr>
+          <a:lstStyle/>
+          <a:p>
+            <a:r>
+              <a:rPr lang="en-US" dirty="0" smtClean="0"/>
+              <a:t>See more large network datasets at:</a:t>
+            </a:r>
+          </a:p>
+          <a:p>
+            <a:r>
+              <a:rPr lang="en-US" dirty="0"/>
+              <a:t>  </a:t>
+            </a:r>
+            <a:r>
+              <a:rPr lang="en-US" dirty="0" smtClean="0">
+                <a:hlinkClick r:id="rId4"/>
+              </a:rPr>
+              <a:t>https</a:t>
+            </a:r>
+            <a:r>
+              <a:rPr lang="en-US" dirty="0">
+                <a:hlinkClick r:id="rId4"/>
+              </a:rPr>
+              <a:t>://snap.stanford.edu/data/#</a:t>
+            </a:r>
+            <a:r>
+              <a:rPr lang="en-US" dirty="0" smtClean="0">
+                <a:hlinkClick r:id="rId4"/>
+              </a:rPr>
+              <a:t>web</a:t>
+            </a:r>
+            <a:endParaRPr lang="en-US" dirty="0" smtClean="0"/>
           </a:p>
         </p:txBody>
       </p:sp>
     </p:spTree>
     <p:extLst>
       <p:ext uri="{BB962C8B-B14F-4D97-AF65-F5344CB8AC3E}">
-        <p14:creationId xmlns:p14="http://schemas.microsoft.com/office/powerpoint/2010/main" val="815741486"/>
+        <p14:creationId xmlns:p14="http://schemas.microsoft.com/office/powerpoint/2010/main" val="527425978"/>
       </p:ext>
     </p:extLst>
   </p:cSld>
   <p:clrMapOvr>
     <a:masterClrMapping/>
   </p:clrMapOvr>
+  <p:timing>
+    <p:tnLst>
+      <p:par>
+        <p:cTn id="1" dur="indefinite" restart="never" nodeType="tmRoot"/>
+      </p:par>
+    </p:tnLst>
+  </p:timing>
 </p:sld>
 </file>
 
@@ -6753,15 +7330,7 @@
           <a:p>
             <a:r>
               <a:rPr lang="en-US" dirty="0" smtClean="0"/>
-              <a:t>Web 2.0: </a:t>
-            </a:r>
-            <a:r>
-              <a:rPr lang="en-US" dirty="0" err="1" smtClean="0"/>
-              <a:t>RESTful</a:t>
-            </a:r>
-            <a:r>
-              <a:rPr lang="en-US" dirty="0" smtClean="0"/>
-              <a:t> JSON</a:t>
+              <a:t>Web 2.0: XML</a:t>
             </a:r>
             <a:endParaRPr lang="en-US" dirty="0"/>
           </a:p>
@@ -6789,13 +7358,20 @@
     </p:spTree>
     <p:extLst>
       <p:ext uri="{BB962C8B-B14F-4D97-AF65-F5344CB8AC3E}">
-        <p14:creationId xmlns:p14="http://schemas.microsoft.com/office/powerpoint/2010/main" val="1586755597"/>
+        <p14:creationId xmlns:p14="http://schemas.microsoft.com/office/powerpoint/2010/main" val="1461253917"/>
       </p:ext>
     </p:extLst>
   </p:cSld>
   <p:clrMapOvr>
     <a:masterClrMapping/>
   </p:clrMapOvr>
+  <p:timing>
+    <p:tnLst>
+      <p:par>
+        <p:cTn id="1" dur="indefinite" restart="never" nodeType="tmRoot"/>
+      </p:par>
+    </p:tnLst>
+  </p:timing>
 </p:sld>
 </file>
 
@@ -6833,6 +7409,251 @@
           <a:p>
             <a:r>
               <a:rPr lang="en-US" dirty="0" smtClean="0"/>
+              <a:t>Web 2.0: Web Services</a:t>
+            </a:r>
+            <a:endParaRPr lang="en-US" dirty="0"/>
+          </a:p>
+        </p:txBody>
+      </p:sp>
+      <p:sp>
+        <p:nvSpPr>
+          <p:cNvPr id="3" name="Content Placeholder 2"/>
+          <p:cNvSpPr>
+            <a:spLocks noGrp="1"/>
+          </p:cNvSpPr>
+          <p:nvPr>
+            <p:ph idx="1"/>
+          </p:nvPr>
+        </p:nvSpPr>
+        <p:spPr/>
+        <p:txBody>
+          <a:bodyPr/>
+          <a:lstStyle/>
+          <a:p>
+            <a:endParaRPr lang="en-US" dirty="0"/>
+          </a:p>
+        </p:txBody>
+      </p:sp>
+    </p:spTree>
+    <p:extLst>
+      <p:ext uri="{BB962C8B-B14F-4D97-AF65-F5344CB8AC3E}">
+        <p14:creationId xmlns:p14="http://schemas.microsoft.com/office/powerpoint/2010/main" val="1620994905"/>
+      </p:ext>
+    </p:extLst>
+  </p:cSld>
+  <p:clrMapOvr>
+    <a:masterClrMapping/>
+  </p:clrMapOvr>
+  <p:timing>
+    <p:tnLst>
+      <p:par>
+        <p:cTn id="1" dur="indefinite" restart="never" nodeType="tmRoot"/>
+      </p:par>
+    </p:tnLst>
+  </p:timing>
+</p:sld>
+</file>
+
+<file path=ppt/slides/slide17.xml><?xml version="1.0" encoding="utf-8"?>
+<p:sld xmlns:a="http://schemas.openxmlformats.org/drawingml/2006/main" xmlns:r="http://schemas.openxmlformats.org/officeDocument/2006/relationships" xmlns:p="http://schemas.openxmlformats.org/presentationml/2006/main">
+  <p:cSld>
+    <p:spTree>
+      <p:nvGrpSpPr>
+        <p:cNvPr id="1" name=""/>
+        <p:cNvGrpSpPr/>
+        <p:nvPr/>
+      </p:nvGrpSpPr>
+      <p:grpSpPr>
+        <a:xfrm>
+          <a:off x="0" y="0"/>
+          <a:ext cx="0" cy="0"/>
+          <a:chOff x="0" y="0"/>
+          <a:chExt cx="0" cy="0"/>
+        </a:xfrm>
+      </p:grpSpPr>
+      <p:sp>
+        <p:nvSpPr>
+          <p:cNvPr id="2" name="Title 1"/>
+          <p:cNvSpPr>
+            <a:spLocks noGrp="1"/>
+          </p:cNvSpPr>
+          <p:nvPr>
+            <p:ph type="title"/>
+          </p:nvPr>
+        </p:nvSpPr>
+        <p:spPr/>
+        <p:txBody>
+          <a:bodyPr/>
+          <a:lstStyle/>
+          <a:p>
+            <a:r>
+              <a:rPr lang="en-US" dirty="0" smtClean="0"/>
+              <a:t>Web 2.0: SOAP</a:t>
+            </a:r>
+            <a:endParaRPr lang="en-US" dirty="0"/>
+          </a:p>
+        </p:txBody>
+      </p:sp>
+      <p:sp>
+        <p:nvSpPr>
+          <p:cNvPr id="3" name="Content Placeholder 2"/>
+          <p:cNvSpPr>
+            <a:spLocks noGrp="1"/>
+          </p:cNvSpPr>
+          <p:nvPr>
+            <p:ph idx="1"/>
+          </p:nvPr>
+        </p:nvSpPr>
+        <p:spPr/>
+        <p:txBody>
+          <a:bodyPr/>
+          <a:lstStyle/>
+          <a:p>
+            <a:endParaRPr lang="en-US"/>
+          </a:p>
+        </p:txBody>
+      </p:sp>
+    </p:spTree>
+    <p:extLst>
+      <p:ext uri="{BB962C8B-B14F-4D97-AF65-F5344CB8AC3E}">
+        <p14:creationId xmlns:p14="http://schemas.microsoft.com/office/powerpoint/2010/main" val="815741486"/>
+      </p:ext>
+    </p:extLst>
+  </p:cSld>
+  <p:clrMapOvr>
+    <a:masterClrMapping/>
+  </p:clrMapOvr>
+  <p:timing>
+    <p:tnLst>
+      <p:par>
+        <p:cTn id="1" dur="indefinite" restart="never" nodeType="tmRoot"/>
+      </p:par>
+    </p:tnLst>
+  </p:timing>
+</p:sld>
+</file>
+
+<file path=ppt/slides/slide18.xml><?xml version="1.0" encoding="utf-8"?>
+<p:sld xmlns:a="http://schemas.openxmlformats.org/drawingml/2006/main" xmlns:r="http://schemas.openxmlformats.org/officeDocument/2006/relationships" xmlns:p="http://schemas.openxmlformats.org/presentationml/2006/main">
+  <p:cSld>
+    <p:spTree>
+      <p:nvGrpSpPr>
+        <p:cNvPr id="1" name=""/>
+        <p:cNvGrpSpPr/>
+        <p:nvPr/>
+      </p:nvGrpSpPr>
+      <p:grpSpPr>
+        <a:xfrm>
+          <a:off x="0" y="0"/>
+          <a:ext cx="0" cy="0"/>
+          <a:chOff x="0" y="0"/>
+          <a:chExt cx="0" cy="0"/>
+        </a:xfrm>
+      </p:grpSpPr>
+      <p:sp>
+        <p:nvSpPr>
+          <p:cNvPr id="2" name="Title 1"/>
+          <p:cNvSpPr>
+            <a:spLocks noGrp="1"/>
+          </p:cNvSpPr>
+          <p:nvPr>
+            <p:ph type="title"/>
+          </p:nvPr>
+        </p:nvSpPr>
+        <p:spPr/>
+        <p:txBody>
+          <a:bodyPr/>
+          <a:lstStyle/>
+          <a:p>
+            <a:r>
+              <a:rPr lang="en-US" dirty="0" smtClean="0"/>
+              <a:t>Web 2.0: </a:t>
+            </a:r>
+            <a:r>
+              <a:rPr lang="en-US" dirty="0" err="1" smtClean="0"/>
+              <a:t>RESTful</a:t>
+            </a:r>
+            <a:r>
+              <a:rPr lang="en-US" dirty="0" smtClean="0"/>
+              <a:t> JSON</a:t>
+            </a:r>
+            <a:endParaRPr lang="en-US" dirty="0"/>
+          </a:p>
+        </p:txBody>
+      </p:sp>
+      <p:sp>
+        <p:nvSpPr>
+          <p:cNvPr id="3" name="Content Placeholder 2"/>
+          <p:cNvSpPr>
+            <a:spLocks noGrp="1"/>
+          </p:cNvSpPr>
+          <p:nvPr>
+            <p:ph idx="1"/>
+          </p:nvPr>
+        </p:nvSpPr>
+        <p:spPr/>
+        <p:txBody>
+          <a:bodyPr/>
+          <a:lstStyle/>
+          <a:p>
+            <a:endParaRPr lang="en-US"/>
+          </a:p>
+        </p:txBody>
+      </p:sp>
+    </p:spTree>
+    <p:extLst>
+      <p:ext uri="{BB962C8B-B14F-4D97-AF65-F5344CB8AC3E}">
+        <p14:creationId xmlns:p14="http://schemas.microsoft.com/office/powerpoint/2010/main" val="1586755597"/>
+      </p:ext>
+    </p:extLst>
+  </p:cSld>
+  <p:clrMapOvr>
+    <a:masterClrMapping/>
+  </p:clrMapOvr>
+  <p:timing>
+    <p:tnLst>
+      <p:par>
+        <p:cTn id="1" dur="indefinite" restart="never" nodeType="tmRoot"/>
+      </p:par>
+    </p:tnLst>
+  </p:timing>
+</p:sld>
+</file>
+
+<file path=ppt/slides/slide19.xml><?xml version="1.0" encoding="utf-8"?>
+<p:sld xmlns:a="http://schemas.openxmlformats.org/drawingml/2006/main" xmlns:r="http://schemas.openxmlformats.org/officeDocument/2006/relationships" xmlns:p="http://schemas.openxmlformats.org/presentationml/2006/main">
+  <p:cSld>
+    <p:spTree>
+      <p:nvGrpSpPr>
+        <p:cNvPr id="1" name=""/>
+        <p:cNvGrpSpPr/>
+        <p:nvPr/>
+      </p:nvGrpSpPr>
+      <p:grpSpPr>
+        <a:xfrm>
+          <a:off x="0" y="0"/>
+          <a:ext cx="0" cy="0"/>
+          <a:chOff x="0" y="0"/>
+          <a:chExt cx="0" cy="0"/>
+        </a:xfrm>
+      </p:grpSpPr>
+      <p:sp>
+        <p:nvSpPr>
+          <p:cNvPr id="2" name="Title 1"/>
+          <p:cNvSpPr>
+            <a:spLocks noGrp="1"/>
+          </p:cNvSpPr>
+          <p:nvPr>
+            <p:ph type="title"/>
+          </p:nvPr>
+        </p:nvSpPr>
+        <p:spPr/>
+        <p:txBody>
+          <a:bodyPr/>
+          <a:lstStyle/>
+          <a:p>
+            <a:r>
+              <a:rPr lang="en-US" dirty="0" smtClean="0"/>
               <a:t>Infrastructure: Web 3.0- Semantic</a:t>
             </a:r>
             <a:endParaRPr lang="en-US" dirty="0"/>
@@ -6868,6 +7689,13 @@
   <p:clrMapOvr>
     <a:masterClrMapping/>
   </p:clrMapOvr>
+  <p:timing>
+    <p:tnLst>
+      <p:par>
+        <p:cTn id="1" dur="indefinite" restart="never" nodeType="tmRoot"/>
+      </p:par>
+    </p:tnLst>
+  </p:timing>
 </p:sld>
 </file>
 
@@ -6959,31 +7787,14 @@
         </p:nvSpPr>
         <p:spPr/>
         <p:txBody>
-          <a:bodyPr>
-            <a:normAutofit fontScale="90000"/>
-          </a:bodyPr>
+          <a:bodyPr/>
           <a:lstStyle/>
           <a:p>
             <a:r>
-              <a:rPr lang="en-US" b="1" dirty="0" smtClean="0"/>
-              <a:t>Outline: </a:t>
-            </a:r>
-            <a:r>
-              <a:rPr lang="en-US" dirty="0" smtClean="0"/>
-              <a:t>Class 11 – Guest Lecture</a:t>
-            </a:r>
-            <a:r>
-              <a:rPr lang="en-US" b="1" dirty="0"/>
-              <a:t/>
-            </a:r>
-            <a:br>
-              <a:rPr lang="en-US" b="1" dirty="0"/>
-            </a:br>
-            <a:r>
-              <a:rPr lang="en-US" sz="4000" dirty="0" smtClean="0"/>
-              <a:t>“Social Graphs and Semantic Analytics” </a:t>
-            </a:r>
-            <a:endParaRPr lang="en-US" sz="4000" dirty="0"/>
+              <a:rPr lang="en-US" dirty="0" smtClean="0"/>
+              <a:t>Foundations: Starting from…</a:t>
+            </a:r>
+            <a:endParaRPr lang="en-US" dirty="0"/>
           </a:p>
         </p:txBody>
       </p:sp>
@@ -6999,6 +7810,169 @@
         </p:nvSpPr>
         <p:spPr/>
         <p:txBody>
+          <a:bodyPr>
+            <a:normAutofit fontScale="92500" lnSpcReduction="20000"/>
+          </a:bodyPr>
+          <a:lstStyle/>
+          <a:p>
+            <a:r>
+              <a:rPr lang="en-US" dirty="0" smtClean="0"/>
+              <a:t>Business Intelligence (BI)</a:t>
+            </a:r>
+          </a:p>
+          <a:p>
+            <a:r>
+              <a:rPr lang="en-US" dirty="0" smtClean="0"/>
+              <a:t>Data Warehousing</a:t>
+            </a:r>
+            <a:r>
+              <a:rPr lang="en-US" dirty="0"/>
+              <a:t> </a:t>
+            </a:r>
+            <a:r>
+              <a:rPr lang="en-US" dirty="0" smtClean="0"/>
+              <a:t>/ </a:t>
+            </a:r>
+            <a:r>
+              <a:rPr lang="en-US" dirty="0" smtClean="0"/>
+              <a:t>Big Data</a:t>
+            </a:r>
+          </a:p>
+          <a:p>
+            <a:endParaRPr lang="en-US" dirty="0"/>
+          </a:p>
+          <a:p>
+            <a:r>
+              <a:rPr lang="en-US" dirty="0" smtClean="0"/>
+              <a:t>Today we are going to talk about next gen BI and the tools / technologies being used at the bleeding edge to make sense of big data.</a:t>
+            </a:r>
+          </a:p>
+          <a:p>
+            <a:pPr lvl="1"/>
+            <a:endParaRPr lang="en-US" dirty="0" smtClean="0"/>
+          </a:p>
+          <a:p>
+            <a:pPr lvl="1"/>
+            <a:r>
+              <a:rPr lang="en-US" dirty="0" smtClean="0"/>
+              <a:t>“Business Intelligence 2.0”</a:t>
+            </a:r>
+          </a:p>
+          <a:p>
+            <a:pPr lvl="1"/>
+            <a:endParaRPr lang="en-US" dirty="0" smtClean="0"/>
+          </a:p>
+          <a:p>
+            <a:pPr lvl="1"/>
+            <a:r>
+              <a:rPr lang="en-US" dirty="0" smtClean="0"/>
+              <a:t>Graph databases</a:t>
+            </a:r>
+            <a:endParaRPr lang="en-US" dirty="0"/>
+          </a:p>
+          <a:p>
+            <a:pPr lvl="1"/>
+            <a:endParaRPr lang="en-US" dirty="0" smtClean="0"/>
+          </a:p>
+          <a:p>
+            <a:pPr lvl="1"/>
+            <a:r>
+              <a:rPr lang="en-US" dirty="0" smtClean="0"/>
+              <a:t>Semantic-aware analytics</a:t>
+            </a:r>
+            <a:endParaRPr lang="en-US" dirty="0"/>
+          </a:p>
+        </p:txBody>
+      </p:sp>
+    </p:spTree>
+    <p:extLst>
+      <p:ext uri="{BB962C8B-B14F-4D97-AF65-F5344CB8AC3E}">
+        <p14:creationId xmlns:p14="http://schemas.microsoft.com/office/powerpoint/2010/main" val="1030957834"/>
+      </p:ext>
+    </p:extLst>
+  </p:cSld>
+  <p:clrMapOvr>
+    <a:masterClrMapping/>
+  </p:clrMapOvr>
+  <p:timing>
+    <p:tnLst>
+      <p:par>
+        <p:cTn id="1" dur="indefinite" restart="never" nodeType="tmRoot"/>
+      </p:par>
+    </p:tnLst>
+  </p:timing>
+</p:sld>
+</file>
+
+<file path=ppt/slides/slide4.xml><?xml version="1.0" encoding="utf-8"?>
+<p:sld xmlns:a="http://schemas.openxmlformats.org/drawingml/2006/main" xmlns:r="http://schemas.openxmlformats.org/officeDocument/2006/relationships" xmlns:p="http://schemas.openxmlformats.org/presentationml/2006/main">
+  <p:cSld>
+    <p:spTree>
+      <p:nvGrpSpPr>
+        <p:cNvPr id="1" name=""/>
+        <p:cNvGrpSpPr/>
+        <p:nvPr/>
+      </p:nvGrpSpPr>
+      <p:grpSpPr>
+        <a:xfrm>
+          <a:off x="0" y="0"/>
+          <a:ext cx="0" cy="0"/>
+          <a:chOff x="0" y="0"/>
+          <a:chExt cx="0" cy="0"/>
+        </a:xfrm>
+      </p:grpSpPr>
+      <p:sp>
+        <p:nvSpPr>
+          <p:cNvPr id="2" name="Title 1"/>
+          <p:cNvSpPr>
+            <a:spLocks noGrp="1"/>
+          </p:cNvSpPr>
+          <p:nvPr>
+            <p:ph type="title"/>
+          </p:nvPr>
+        </p:nvSpPr>
+        <p:spPr/>
+        <p:txBody>
+          <a:bodyPr>
+            <a:normAutofit fontScale="90000"/>
+          </a:bodyPr>
+          <a:lstStyle/>
+          <a:p>
+            <a:r>
+              <a:rPr lang="en-US" b="1" dirty="0" smtClean="0"/>
+              <a:t>Outline: </a:t>
+            </a:r>
+            <a:r>
+              <a:rPr lang="en-US" dirty="0" smtClean="0"/>
+              <a:t>Class 11 – Guest Lecture</a:t>
+            </a:r>
+            <a:r>
+              <a:rPr lang="en-US" b="1" dirty="0"/>
+              <a:t/>
+            </a:r>
+            <a:br>
+              <a:rPr lang="en-US" b="1" dirty="0"/>
+            </a:br>
+            <a:r>
+              <a:rPr lang="en-US" sz="4000" dirty="0" smtClean="0"/>
+              <a:t>“Social Graphs and Semantic Analytics” </a:t>
+            </a:r>
+            <a:endParaRPr lang="en-US" sz="4000" dirty="0"/>
+          </a:p>
+        </p:txBody>
+      </p:sp>
+      <p:sp>
+        <p:nvSpPr>
+          <p:cNvPr id="3" name="Content Placeholder 2"/>
+          <p:cNvSpPr>
+            <a:spLocks noGrp="1"/>
+          </p:cNvSpPr>
+          <p:nvPr>
+            <p:ph idx="1"/>
+          </p:nvPr>
+        </p:nvSpPr>
+        <p:spPr/>
+        <p:txBody>
           <a:bodyPr numCol="2">
             <a:normAutofit/>
           </a:bodyPr>
@@ -7030,7 +8004,6 @@
               <a:rPr lang="en-US" sz="1400" dirty="0" smtClean="0"/>
               <a:t>(linguistics)</a:t>
             </a:r>
-            <a:endParaRPr lang="en-US" sz="1400" dirty="0" smtClean="0"/>
           </a:p>
           <a:p>
             <a:r>
@@ -7119,11 +8092,7 @@
             <a:pPr lvl="1"/>
             <a:r>
               <a:rPr lang="en-US" dirty="0" smtClean="0"/>
-              <a:t>Where </a:t>
-            </a:r>
-            <a:r>
-              <a:rPr lang="en-US" dirty="0" smtClean="0"/>
-              <a:t>would you start?</a:t>
+              <a:t>Where would you start?</a:t>
             </a:r>
           </a:p>
         </p:txBody>
@@ -7865,93 +8834,6 @@
 </p:sld>
 </file>
 
-<file path=ppt/slides/slide4.xml><?xml version="1.0" encoding="utf-8"?>
-<p:sld xmlns:a="http://schemas.openxmlformats.org/drawingml/2006/main" xmlns:r="http://schemas.openxmlformats.org/officeDocument/2006/relationships" xmlns:p="http://schemas.openxmlformats.org/presentationml/2006/main">
-  <p:cSld>
-    <p:spTree>
-      <p:nvGrpSpPr>
-        <p:cNvPr id="1" name=""/>
-        <p:cNvGrpSpPr/>
-        <p:nvPr/>
-      </p:nvGrpSpPr>
-      <p:grpSpPr>
-        <a:xfrm>
-          <a:off x="0" y="0"/>
-          <a:ext cx="0" cy="0"/>
-          <a:chOff x="0" y="0"/>
-          <a:chExt cx="0" cy="0"/>
-        </a:xfrm>
-      </p:grpSpPr>
-      <p:sp>
-        <p:nvSpPr>
-          <p:cNvPr id="2" name="Title 1"/>
-          <p:cNvSpPr>
-            <a:spLocks noGrp="1"/>
-          </p:cNvSpPr>
-          <p:nvPr>
-            <p:ph type="title"/>
-          </p:nvPr>
-        </p:nvSpPr>
-        <p:spPr/>
-        <p:txBody>
-          <a:bodyPr/>
-          <a:lstStyle/>
-          <a:p>
-            <a:r>
-              <a:rPr lang="en-US" dirty="0" smtClean="0"/>
-              <a:t>Foundations</a:t>
-            </a:r>
-            <a:endParaRPr lang="en-US" dirty="0"/>
-          </a:p>
-        </p:txBody>
-      </p:sp>
-      <p:sp>
-        <p:nvSpPr>
-          <p:cNvPr id="3" name="Content Placeholder 2"/>
-          <p:cNvSpPr>
-            <a:spLocks noGrp="1"/>
-          </p:cNvSpPr>
-          <p:nvPr>
-            <p:ph idx="1"/>
-          </p:nvPr>
-        </p:nvSpPr>
-        <p:spPr/>
-        <p:txBody>
-          <a:bodyPr/>
-          <a:lstStyle/>
-          <a:p>
-            <a:r>
-              <a:rPr lang="en-US" dirty="0" smtClean="0"/>
-              <a:t>Abstraction</a:t>
-            </a:r>
-          </a:p>
-          <a:p>
-            <a:r>
-              <a:rPr lang="en-US" dirty="0" smtClean="0"/>
-              <a:t>Business Intelligence / Data Warehousing</a:t>
-            </a:r>
-          </a:p>
-          <a:p>
-            <a:r>
-              <a:rPr lang="en-US" dirty="0" smtClean="0"/>
-              <a:t>Big Data</a:t>
-            </a:r>
-          </a:p>
-        </p:txBody>
-      </p:sp>
-    </p:spTree>
-    <p:extLst>
-      <p:ext uri="{BB962C8B-B14F-4D97-AF65-F5344CB8AC3E}">
-        <p14:creationId xmlns:p14="http://schemas.microsoft.com/office/powerpoint/2010/main" val="1030957834"/>
-      </p:ext>
-    </p:extLst>
-  </p:cSld>
-  <p:clrMapOvr>
-    <a:masterClrMapping/>
-  </p:clrMapOvr>
-</p:sld>
-</file>
-
 <file path=ppt/slides/slide5.xml><?xml version="1.0" encoding="utf-8"?>
 <p:sld xmlns:a="http://schemas.openxmlformats.org/drawingml/2006/main" xmlns:r="http://schemas.openxmlformats.org/officeDocument/2006/relationships" xmlns:p="http://schemas.openxmlformats.org/presentationml/2006/main">
   <p:cSld>
@@ -8061,8 +8943,13 @@
             </a:r>
             <a:r>
               <a:rPr lang="en-US" dirty="0" smtClean="0"/>
-              <a:t>of unordered (edge) and ordered (arc) pairs of vertices.</a:t>
-            </a:r>
+              <a:t>of unordered (edge) and ordered (arc) pairs of vertices</a:t>
+            </a:r>
+            <a:r>
+              <a:rPr lang="en-US" dirty="0" smtClean="0"/>
+              <a:t>.</a:t>
+            </a:r>
+            <a:endParaRPr lang="en-US" dirty="0" smtClean="0"/>
           </a:p>
           <a:p>
             <a:pPr lvl="1">
@@ -8155,16 +9042,21 @@
             </a:pPr>
             <a:r>
               <a:rPr lang="en-US" dirty="0" smtClean="0"/>
-              <a:t>Multi-Graph (G</a:t>
-            </a:r>
-            <a:r>
-              <a:rPr lang="en-US" baseline="-25000" dirty="0" smtClean="0"/>
-              <a:t>m</a:t>
+              <a:t>Mixed Graph (</a:t>
+            </a:r>
+            <a:r>
+              <a:rPr lang="en-US" dirty="0" err="1" smtClean="0"/>
+              <a:t>G</a:t>
+            </a:r>
+            <a:r>
+              <a:rPr lang="en-US" baseline="-25000" dirty="0" err="1" smtClean="0"/>
+              <a:t>x</a:t>
             </a:r>
             <a:r>
               <a:rPr lang="en-US" dirty="0" smtClean="0"/>
               <a:t>)</a:t>
             </a:r>
+            <a:endParaRPr lang="en-US" dirty="0" smtClean="0"/>
           </a:p>
           <a:p>
             <a:pPr lvl="1">
@@ -8175,7 +9067,26 @@
                 <a:spcPts val="0"/>
               </a:spcBef>
             </a:pPr>
-            <a:endParaRPr lang="en-US" dirty="0"/>
+            <a:r>
+              <a:rPr lang="en-US" dirty="0" err="1" smtClean="0"/>
+              <a:t>Multigraph</a:t>
+            </a:r>
+            <a:r>
+              <a:rPr lang="en-US" dirty="0" smtClean="0"/>
+              <a:t> </a:t>
+            </a:r>
+            <a:r>
+              <a:rPr lang="en-US" dirty="0" smtClean="0"/>
+              <a:t>(G</a:t>
+            </a:r>
+            <a:r>
+              <a:rPr lang="en-US" baseline="-25000" dirty="0" smtClean="0"/>
+              <a:t>m</a:t>
+            </a:r>
+            <a:r>
+              <a:rPr lang="en-US" dirty="0" smtClean="0"/>
+              <a:t>)</a:t>
+            </a:r>
           </a:p>
         </p:txBody>
       </p:sp>
@@ -8242,11 +9153,7 @@
           <a:p>
             <a:r>
               <a:rPr lang="en-US" sz="900" dirty="0"/>
-              <a:t>Graph.</a:t>
-            </a:r>
-            <a:r>
-              <a:rPr lang="en-US" sz="900" dirty="0"/>
-              <a:t> </a:t>
+              <a:t>Graph. </a:t>
             </a:r>
             <a:r>
               <a:rPr lang="en-US" sz="900" i="1" dirty="0"/>
@@ -8254,11 +9161,7 @@
             </a:r>
             <a:r>
               <a:rPr lang="en-US" sz="900" dirty="0"/>
-              <a:t> </a:t>
-            </a:r>
-            <a:r>
-              <a:rPr lang="en-US" sz="900" dirty="0"/>
-              <a:t>URL: </a:t>
+              <a:t> URL: </a:t>
             </a:r>
             <a:r>
               <a:rPr lang="en-US" sz="900" dirty="0">
@@ -8276,6 +9179,126 @@
           </a:p>
         </p:txBody>
       </p:sp>
+      <p:pic>
+        <p:nvPicPr>
+          <p:cNvPr id="11" name="Picture 10"/>
+          <p:cNvPicPr>
+            <a:picLocks noChangeAspect="1"/>
+          </p:cNvPicPr>
+          <p:nvPr/>
+        </p:nvPicPr>
+        <p:blipFill>
+          <a:blip r:embed="rId4">
+            <a:extLst>
+              <a:ext uri="{28A0092B-C50C-407E-A947-70E740481C1C}">
+                <a14:useLocalDpi xmlns:a14="http://schemas.microsoft.com/office/drawing/2010/main" val="0"/>
+              </a:ext>
+            </a:extLst>
+          </a:blip>
+          <a:stretch>
+            <a:fillRect/>
+          </a:stretch>
+        </p:blipFill>
+        <p:spPr>
+          <a:xfrm>
+            <a:off x="4559785" y="4454899"/>
+            <a:ext cx="2103750" cy="1800000"/>
+          </a:xfrm>
+          <a:prstGeom prst="rect">
+            <a:avLst/>
+          </a:prstGeom>
+        </p:spPr>
+      </p:pic>
+      <p:pic>
+        <p:nvPicPr>
+          <p:cNvPr id="12" name="Picture 11"/>
+          <p:cNvPicPr>
+            <a:picLocks noChangeAspect="1"/>
+          </p:cNvPicPr>
+          <p:nvPr/>
+        </p:nvPicPr>
+        <p:blipFill>
+          <a:blip r:embed="rId5">
+            <a:extLst>
+              <a:ext uri="{28A0092B-C50C-407E-A947-70E740481C1C}">
+                <a14:useLocalDpi xmlns:a14="http://schemas.microsoft.com/office/drawing/2010/main" val="0"/>
+              </a:ext>
+            </a:extLst>
+          </a:blip>
+          <a:stretch>
+            <a:fillRect/>
+          </a:stretch>
+        </p:blipFill>
+        <p:spPr>
+          <a:xfrm>
+            <a:off x="6532440" y="4452081"/>
+            <a:ext cx="2103750" cy="1800000"/>
+          </a:xfrm>
+          <a:prstGeom prst="rect">
+            <a:avLst/>
+          </a:prstGeom>
+        </p:spPr>
+      </p:pic>
+      <p:pic>
+        <p:nvPicPr>
+          <p:cNvPr id="13" name="Picture 12"/>
+          <p:cNvPicPr>
+            <a:picLocks noChangeAspect="1"/>
+          </p:cNvPicPr>
+          <p:nvPr/>
+        </p:nvPicPr>
+        <p:blipFill>
+          <a:blip r:embed="rId6">
+            <a:extLst>
+              <a:ext uri="{28A0092B-C50C-407E-A947-70E740481C1C}">
+                <a14:useLocalDpi xmlns:a14="http://schemas.microsoft.com/office/drawing/2010/main" val="0"/>
+              </a:ext>
+            </a:extLst>
+          </a:blip>
+          <a:stretch>
+            <a:fillRect/>
+          </a:stretch>
+        </p:blipFill>
+        <p:spPr>
+          <a:xfrm>
+            <a:off x="4559785" y="2800808"/>
+            <a:ext cx="2103750" cy="1800000"/>
+          </a:xfrm>
+          <a:prstGeom prst="rect">
+            <a:avLst/>
+          </a:prstGeom>
+        </p:spPr>
+      </p:pic>
+      <p:pic>
+        <p:nvPicPr>
+          <p:cNvPr id="14" name="Picture 13"/>
+          <p:cNvPicPr>
+            <a:picLocks noChangeAspect="1"/>
+          </p:cNvPicPr>
+          <p:nvPr/>
+        </p:nvPicPr>
+        <p:blipFill>
+          <a:blip r:embed="rId7">
+            <a:extLst>
+              <a:ext uri="{28A0092B-C50C-407E-A947-70E740481C1C}">
+                <a14:useLocalDpi xmlns:a14="http://schemas.microsoft.com/office/drawing/2010/main" val="0"/>
+              </a:ext>
+            </a:extLst>
+          </a:blip>
+          <a:stretch>
+            <a:fillRect/>
+          </a:stretch>
+        </p:blipFill>
+        <p:spPr>
+          <a:xfrm>
+            <a:off x="6532440" y="2800808"/>
+            <a:ext cx="2103750" cy="1800000"/>
+          </a:xfrm>
+          <a:prstGeom prst="rect">
+            <a:avLst/>
+          </a:prstGeom>
+        </p:spPr>
+      </p:pic>
     </p:spTree>
     <p:extLst>
       <p:ext uri="{BB962C8B-B14F-4D97-AF65-F5344CB8AC3E}">
@@ -8286,6 +9309,13 @@
   <p:clrMapOvr>
     <a:masterClrMapping/>
   </p:clrMapOvr>
+  <p:timing>
+    <p:tnLst>
+      <p:par>
+        <p:cTn id="1" dur="indefinite" restart="never" nodeType="tmRoot"/>
+      </p:par>
+    </p:tnLst>
+  </p:timing>
 </p:sld>
 </file>
 
@@ -8341,10 +9371,241 @@
         </p:nvSpPr>
         <p:spPr/>
         <p:txBody>
-          <a:bodyPr/>
+          <a:bodyPr>
+            <a:normAutofit fontScale="92500" lnSpcReduction="10000"/>
+          </a:bodyPr>
           <a:lstStyle/>
           <a:p>
-            <a:endParaRPr lang="en-US"/>
+            <a:r>
+              <a:rPr lang="en-US" dirty="0" smtClean="0"/>
+              <a:t>Definition: Semantics</a:t>
+            </a:r>
+          </a:p>
+          <a:p>
+            <a:pPr lvl="1"/>
+            <a:r>
+              <a:rPr lang="en-US" dirty="0"/>
+              <a:t>The branch of linguistics and logic concerned with meaning</a:t>
+            </a:r>
+            <a:r>
+              <a:rPr lang="en-US" dirty="0" smtClean="0"/>
+              <a:t>. </a:t>
+            </a:r>
+            <a:r>
+              <a:rPr lang="en-US" dirty="0"/>
+              <a:t>There are a number of branches and </a:t>
+            </a:r>
+            <a:r>
+              <a:rPr lang="en-US" dirty="0" smtClean="0"/>
+              <a:t>sub branches </a:t>
+            </a:r>
+            <a:r>
+              <a:rPr lang="en-US" dirty="0"/>
+              <a:t>of semantics, </a:t>
+            </a:r>
+            <a:r>
+              <a:rPr lang="en-US" dirty="0" smtClean="0"/>
+              <a:t>including:</a:t>
+            </a:r>
+          </a:p>
+          <a:p>
+            <a:pPr lvl="2"/>
+            <a:r>
+              <a:rPr lang="en-US" b="1" dirty="0" smtClean="0"/>
+              <a:t>formal </a:t>
+            </a:r>
+            <a:r>
+              <a:rPr lang="en-US" b="1" dirty="0"/>
+              <a:t>semantics</a:t>
+            </a:r>
+            <a:r>
+              <a:rPr lang="en-US" dirty="0"/>
+              <a:t>, which studies the logical aspects of meaning, such as sense, reference, implication, and logical </a:t>
+            </a:r>
+            <a:r>
+              <a:rPr lang="en-US" dirty="0" smtClean="0"/>
+              <a:t>form,</a:t>
+            </a:r>
+          </a:p>
+          <a:p>
+            <a:pPr lvl="2"/>
+            <a:r>
+              <a:rPr lang="en-US" b="1" dirty="0" smtClean="0"/>
+              <a:t>lexical </a:t>
+            </a:r>
+            <a:r>
+              <a:rPr lang="en-US" b="1" dirty="0"/>
+              <a:t>semantics</a:t>
+            </a:r>
+            <a:r>
+              <a:rPr lang="en-US" dirty="0"/>
+              <a:t>, which studies word meanings and word relations, </a:t>
+            </a:r>
+            <a:r>
+              <a:rPr lang="en-US" dirty="0" smtClean="0"/>
+              <a:t>and;</a:t>
+            </a:r>
+          </a:p>
+          <a:p>
+            <a:pPr lvl="2"/>
+            <a:r>
+              <a:rPr lang="en-US" b="1" dirty="0" smtClean="0"/>
+              <a:t>conceptual </a:t>
+            </a:r>
+            <a:r>
+              <a:rPr lang="en-US" b="1" dirty="0"/>
+              <a:t>semantics</a:t>
+            </a:r>
+            <a:r>
+              <a:rPr lang="en-US" dirty="0"/>
+              <a:t>, which studies the cognitive structure of meaning</a:t>
+            </a:r>
+            <a:r>
+              <a:rPr lang="en-US" dirty="0" smtClean="0"/>
+              <a:t>.</a:t>
+            </a:r>
+          </a:p>
+          <a:p>
+            <a:r>
+              <a:rPr lang="en-US" dirty="0" smtClean="0"/>
+              <a:t>We are interested in </a:t>
+            </a:r>
+            <a:r>
+              <a:rPr lang="en-US" b="1" dirty="0" smtClean="0"/>
+              <a:t>Computational Semantics</a:t>
+            </a:r>
+            <a:r>
+              <a:rPr lang="en-US" dirty="0" smtClean="0"/>
+              <a:t>, the study of how to automate the process of constructing and reasoning with </a:t>
+            </a:r>
+            <a:r>
+              <a:rPr lang="en-US" dirty="0"/>
+              <a:t>meaning </a:t>
+            </a:r>
+            <a:r>
+              <a:rPr lang="en-US" dirty="0" smtClean="0"/>
+              <a:t>representations </a:t>
+            </a:r>
+            <a:r>
+              <a:rPr lang="en-US" sz="1100" dirty="0" smtClean="0"/>
+              <a:t>[source</a:t>
+            </a:r>
+            <a:r>
+              <a:rPr lang="en-US" sz="1100" dirty="0"/>
+              <a:t>: </a:t>
+            </a:r>
+            <a:r>
+              <a:rPr lang="en-US" sz="1100" dirty="0">
+                <a:hlinkClick r:id="rId2"/>
+              </a:rPr>
+              <a:t>https://</a:t>
+            </a:r>
+            <a:r>
+              <a:rPr lang="en-US" sz="1100" dirty="0" smtClean="0">
+                <a:hlinkClick r:id="rId2"/>
+              </a:rPr>
+              <a:t>en.wikipedia.org/wiki/Computational_semantics</a:t>
+            </a:r>
+            <a:r>
+              <a:rPr lang="en-US" sz="1100" dirty="0" smtClean="0"/>
+              <a:t>]</a:t>
+            </a:r>
+            <a:endParaRPr lang="en-US" sz="1100" b="1" dirty="0"/>
+          </a:p>
+        </p:txBody>
+      </p:sp>
+      <p:sp>
+        <p:nvSpPr>
+          <p:cNvPr id="7" name="TextBox 6"/>
+          <p:cNvSpPr txBox="1"/>
+          <p:nvPr/>
+        </p:nvSpPr>
+        <p:spPr>
+          <a:xfrm>
+            <a:off x="5699342" y="6313118"/>
+            <a:ext cx="2816008" cy="369332"/>
+          </a:xfrm>
+          <a:prstGeom prst="rect">
+            <a:avLst/>
+          </a:prstGeom>
+          <a:noFill/>
+        </p:spPr>
+        <p:txBody>
+          <a:bodyPr wrap="square" rtlCol="0">
+            <a:spAutoFit/>
+          </a:bodyPr>
+          <a:lstStyle/>
+          <a:p>
+            <a:pPr algn="r"/>
+            <a:r>
+              <a:rPr lang="en-US" dirty="0">
+                <a:hlinkClick r:id="rId3"/>
+              </a:rPr>
+              <a:t>http://</a:t>
+            </a:r>
+            <a:r>
+              <a:rPr lang="en-US" dirty="0" smtClean="0">
+                <a:hlinkClick r:id="rId3"/>
+              </a:rPr>
+              <a:t>bit.ly/1pYQ8bg</a:t>
+            </a:r>
+            <a:endParaRPr lang="en-US" dirty="0" smtClean="0"/>
+          </a:p>
+        </p:txBody>
+      </p:sp>
+      <p:sp>
+        <p:nvSpPr>
+          <p:cNvPr id="8" name="TextBox 7"/>
+          <p:cNvSpPr txBox="1"/>
+          <p:nvPr/>
+        </p:nvSpPr>
+        <p:spPr>
+          <a:xfrm>
+            <a:off x="628650" y="6313118"/>
+            <a:ext cx="4983010" cy="369332"/>
+          </a:xfrm>
+          <a:prstGeom prst="rect">
+            <a:avLst/>
+          </a:prstGeom>
+          <a:noFill/>
+        </p:spPr>
+        <p:txBody>
+          <a:bodyPr wrap="square" rtlCol="0">
+            <a:spAutoFit/>
+          </a:bodyPr>
+          <a:lstStyle/>
+          <a:p>
+            <a:r>
+              <a:rPr lang="en-US" sz="900" dirty="0" smtClean="0"/>
+              <a:t>Semantics</a:t>
+            </a:r>
+            <a:r>
+              <a:rPr lang="en-US" sz="900" dirty="0" smtClean="0"/>
+              <a:t>. </a:t>
+            </a:r>
+            <a:r>
+              <a:rPr lang="en-US" sz="900" i="1" dirty="0" smtClean="0"/>
+              <a:t>Oxford Dictionary Online.</a:t>
+            </a:r>
+            <a:r>
+              <a:rPr lang="en-US" sz="900" dirty="0" smtClean="0"/>
+              <a:t> URL:</a:t>
+            </a:r>
+          </a:p>
+          <a:p>
+            <a:r>
+              <a:rPr lang="en-US" sz="900" dirty="0">
+                <a:hlinkClick r:id="rId4"/>
+              </a:rPr>
+              <a:t>http://</a:t>
+            </a:r>
+            <a:r>
+              <a:rPr lang="en-US" sz="900" dirty="0" smtClean="0">
+                <a:hlinkClick r:id="rId4"/>
+              </a:rPr>
+              <a:t>www.oxforddictionaries.com/us/definition/american_english/semantics</a:t>
+            </a:r>
+            <a:endParaRPr lang="en-US" sz="900" dirty="0" smtClean="0"/>
           </a:p>
         </p:txBody>
       </p:sp>
@@ -8358,6 +9619,13 @@
   <p:clrMapOvr>
     <a:masterClrMapping/>
   </p:clrMapOvr>
+  <p:timing>
+    <p:tnLst>
+      <p:par>
+        <p:cTn id="1" dur="indefinite" restart="never" nodeType="tmRoot"/>
+      </p:par>
+    </p:tnLst>
+  </p:timing>
 </p:sld>
 </file>
 
@@ -8395,7 +9663,7 @@
           <a:p>
             <a:r>
               <a:rPr lang="en-US" dirty="0" smtClean="0"/>
-              <a:t>Infrastructure: Web 2.0- Social</a:t>
+              <a:t>Foundations: Semantic Models</a:t>
             </a:r>
             <a:endParaRPr lang="en-US" dirty="0"/>
           </a:p>
@@ -8413,144 +9681,102 @@
         </p:nvSpPr>
         <p:spPr/>
         <p:txBody>
-          <a:bodyPr>
-            <a:normAutofit lnSpcReduction="10000"/>
+          <a:bodyPr/>
+          <a:lstStyle/>
+          <a:p>
+            <a:r>
+              <a:rPr lang="en-US" dirty="0" smtClean="0"/>
+              <a:t>We can combine the concepts of graphs and semantics to build what are called </a:t>
+            </a:r>
+            <a:r>
+              <a:rPr lang="en-US" b="1" dirty="0" smtClean="0"/>
+              <a:t>semantic models</a:t>
+            </a:r>
+            <a:r>
+              <a:rPr lang="en-US" dirty="0" smtClean="0"/>
+              <a:t>.</a:t>
+            </a:r>
+          </a:p>
+          <a:p>
+            <a:r>
+              <a:rPr lang="en-US" dirty="0" smtClean="0"/>
+              <a:t>Example:</a:t>
+            </a:r>
+            <a:endParaRPr lang="en-US" sz="1600" dirty="0" smtClean="0"/>
+          </a:p>
+        </p:txBody>
+      </p:sp>
+      <p:sp>
+        <p:nvSpPr>
+          <p:cNvPr id="4" name="TextBox 3"/>
+          <p:cNvSpPr txBox="1"/>
+          <p:nvPr/>
+        </p:nvSpPr>
+        <p:spPr>
+          <a:xfrm>
+            <a:off x="5010411" y="1290181"/>
+            <a:ext cx="3732756" cy="369332"/>
+          </a:xfrm>
+          <a:prstGeom prst="rect">
+            <a:avLst/>
+          </a:prstGeom>
+          <a:noFill/>
+        </p:spPr>
+        <p:txBody>
+          <a:bodyPr wrap="square" rtlCol="0">
+            <a:spAutoFit/>
           </a:bodyPr>
           <a:lstStyle/>
           <a:p>
             <a:r>
               <a:rPr lang="en-US" dirty="0" smtClean="0"/>
-              <a:t>A number of concepts and technologies make up what we think of as Web 2.0:</a:t>
-            </a:r>
-          </a:p>
-          <a:p>
-            <a:pPr lvl="1"/>
-            <a:r>
-              <a:rPr lang="en-US" b="1" dirty="0" smtClean="0"/>
-              <a:t>HTTP: </a:t>
-            </a:r>
-            <a:r>
-              <a:rPr lang="en-US" dirty="0" smtClean="0"/>
-              <a:t>Hypertext Transfer Protocol</a:t>
-            </a:r>
-          </a:p>
-          <a:p>
-            <a:pPr lvl="1"/>
-            <a:r>
-              <a:rPr lang="en-US" b="1" dirty="0"/>
-              <a:t>URLs: </a:t>
-            </a:r>
-            <a:r>
-              <a:rPr lang="en-US" dirty="0"/>
-              <a:t>Uniform Resource Locators</a:t>
-            </a:r>
-          </a:p>
-          <a:p>
-            <a:pPr lvl="2"/>
-            <a:r>
-              <a:rPr lang="en-US" dirty="0"/>
-              <a:t>A specific type of Uniform Resource Identifier (URI</a:t>
-            </a:r>
-            <a:r>
-              <a:rPr lang="en-US" dirty="0" smtClean="0"/>
-              <a:t>)</a:t>
-            </a:r>
-          </a:p>
-          <a:p>
-            <a:pPr lvl="1"/>
-            <a:r>
-              <a:rPr lang="en-US" b="1" dirty="0" smtClean="0"/>
-              <a:t>HTML: </a:t>
-            </a:r>
-            <a:r>
-              <a:rPr lang="en-US" dirty="0" smtClean="0"/>
-              <a:t>Hypertext Markup Language</a:t>
-            </a:r>
-          </a:p>
-          <a:p>
-            <a:pPr lvl="2"/>
-            <a:r>
-              <a:rPr lang="en-US" dirty="0" smtClean="0"/>
-              <a:t>With JavaScript and Cascading Style Sheets (CSS)</a:t>
-            </a:r>
-          </a:p>
-          <a:p>
-            <a:pPr lvl="1"/>
-            <a:r>
-              <a:rPr lang="en-US" b="1" dirty="0" smtClean="0"/>
-              <a:t>XML:</a:t>
-            </a:r>
-            <a:r>
-              <a:rPr lang="en-US" dirty="0" smtClean="0"/>
-              <a:t> E</a:t>
-            </a:r>
-            <a:r>
-              <a:rPr lang="en-US" dirty="0"/>
-              <a:t>x</a:t>
-            </a:r>
-            <a:r>
-              <a:rPr lang="en-US" dirty="0" smtClean="0"/>
-              <a:t>tensible Markup Language</a:t>
-            </a:r>
-          </a:p>
-          <a:p>
-            <a:pPr lvl="1"/>
-            <a:r>
-              <a:rPr lang="en-US" b="1" dirty="0" smtClean="0"/>
-              <a:t>Web Services:</a:t>
-            </a:r>
-          </a:p>
-          <a:p>
-            <a:pPr lvl="2"/>
-            <a:r>
-              <a:rPr lang="en-US" b="1" dirty="0" smtClean="0"/>
-              <a:t>SOAP: </a:t>
-            </a:r>
-            <a:r>
-              <a:rPr lang="en-US" dirty="0"/>
-              <a:t>Simple Object Access Protocol</a:t>
-            </a:r>
-            <a:endParaRPr lang="en-US" dirty="0" smtClean="0"/>
-          </a:p>
-          <a:p>
-            <a:pPr lvl="2"/>
-            <a:r>
-              <a:rPr lang="en-US" b="1" dirty="0" err="1" smtClean="0"/>
-              <a:t>RESTful</a:t>
-            </a:r>
-            <a:r>
-              <a:rPr lang="en-US" b="1" dirty="0" smtClean="0"/>
-              <a:t> JSON: </a:t>
-            </a:r>
-            <a:r>
-              <a:rPr lang="en-US" dirty="0" smtClean="0"/>
-              <a:t>Representational State Transfer JavaScript Object Notation</a:t>
-            </a:r>
-          </a:p>
-          <a:p>
-            <a:pPr lvl="1"/>
-            <a:endParaRPr lang="en-US" dirty="0" smtClean="0"/>
-          </a:p>
-          <a:p>
-            <a:pPr lvl="1"/>
-            <a:endParaRPr lang="en-US" dirty="0" smtClean="0"/>
-          </a:p>
-          <a:p>
-            <a:pPr lvl="1"/>
+              <a:t>a.k.a. Semantic Networks</a:t>
+            </a:r>
             <a:endParaRPr lang="en-US" dirty="0"/>
           </a:p>
         </p:txBody>
       </p:sp>
+      <p:pic>
+        <p:nvPicPr>
+          <p:cNvPr id="6" name="Picture 5"/>
+          <p:cNvPicPr>
+            <a:picLocks noChangeAspect="1"/>
+          </p:cNvPicPr>
+          <p:nvPr/>
+        </p:nvPicPr>
+        <p:blipFill>
+          <a:blip r:embed="rId2"/>
+          <a:stretch>
+            <a:fillRect/>
+          </a:stretch>
+        </p:blipFill>
+        <p:spPr>
+          <a:xfrm>
+            <a:off x="2238418" y="2985543"/>
+            <a:ext cx="4269677" cy="3665777"/>
+          </a:xfrm>
+          <a:prstGeom prst="rect">
+            <a:avLst/>
+          </a:prstGeom>
+        </p:spPr>
+      </p:pic>
     </p:spTree>
     <p:extLst>
       <p:ext uri="{BB962C8B-B14F-4D97-AF65-F5344CB8AC3E}">
-        <p14:creationId xmlns:p14="http://schemas.microsoft.com/office/powerpoint/2010/main" val="1033790560"/>
+        <p14:creationId xmlns:p14="http://schemas.microsoft.com/office/powerpoint/2010/main" val="1627128059"/>
       </p:ext>
     </p:extLst>
   </p:cSld>
   <p:clrMapOvr>
     <a:masterClrMapping/>
   </p:clrMapOvr>
+  <p:timing>
+    <p:tnLst>
+      <p:par>
+        <p:cTn id="1" dur="indefinite" restart="never" nodeType="tmRoot"/>
+      </p:par>
+    </p:tnLst>
+  </p:timing>
 </p:sld>
 </file>
 
@@ -8588,7 +9814,7 @@
           <a:p>
             <a:r>
               <a:rPr lang="en-US" dirty="0" smtClean="0"/>
-              <a:t>Web 2.0: HTTP</a:t>
+              <a:t>Infrastructure: Web 2.0- Social</a:t>
             </a:r>
             <a:endParaRPr lang="en-US" dirty="0"/>
           </a:p>
@@ -8606,41 +9832,127 @@
         </p:nvSpPr>
         <p:spPr/>
         <p:txBody>
-          <a:bodyPr/>
+          <a:bodyPr>
+            <a:normAutofit lnSpcReduction="10000"/>
+          </a:bodyPr>
           <a:lstStyle/>
           <a:p>
             <a:r>
               <a:rPr lang="en-US" dirty="0" smtClean="0"/>
-              <a:t>Hypertext Transfer Protocol (HTTP)</a:t>
+              <a:t>A number of concepts and technologies make up what we think of as Web 2.0:</a:t>
             </a:r>
           </a:p>
           <a:p>
             <a:pPr lvl="1"/>
             <a:r>
-              <a:rPr lang="en-US" dirty="0" smtClean="0"/>
-              <a:t>Usually carried over Transmission Control Protocol (TCP) Internet Protocol (IP) networks.</a:t>
+              <a:rPr lang="en-US" b="1" dirty="0" smtClean="0"/>
+              <a:t>HTTP: </a:t>
+            </a:r>
+            <a:r>
+              <a:rPr lang="en-US" dirty="0" smtClean="0"/>
+              <a:t>Hypertext Transfer Protocol</a:t>
             </a:r>
           </a:p>
           <a:p>
             <a:pPr lvl="1"/>
             <a:r>
-              <a:rPr lang="en-US" dirty="0" smtClean="0"/>
-              <a:t>Provides a simple dialect (application protocol) to ask for, give, and receive text-based information.</a:t>
+              <a:rPr lang="en-US" b="1" dirty="0"/>
+              <a:t>URLs: </a:t>
+            </a:r>
+            <a:r>
+              <a:rPr lang="en-US" dirty="0"/>
+              <a:t>Uniform Resource Locators</a:t>
+            </a:r>
+          </a:p>
+          <a:p>
+            <a:pPr lvl="2"/>
+            <a:r>
+              <a:rPr lang="en-US" dirty="0"/>
+              <a:t>A specific type of Uniform Resource Identifier (URI</a:t>
+            </a:r>
+            <a:r>
+              <a:rPr lang="en-US" dirty="0" smtClean="0"/>
+              <a:t>)</a:t>
             </a:r>
           </a:p>
           <a:p>
             <a:pPr lvl="1"/>
             <a:r>
-              <a:rPr lang="en-US" dirty="0" smtClean="0"/>
-              <a:t>Connects nodes (vertices) of ‘hypertext’ across ‘hyperlinks’ (arcs).</a:t>
+              <a:rPr lang="en-US" b="1" dirty="0" smtClean="0"/>
+              <a:t>HTML: </a:t>
+            </a:r>
+            <a:r>
+              <a:rPr lang="en-US" dirty="0" smtClean="0"/>
+              <a:t>Hypertext Markup Language</a:t>
+            </a:r>
+          </a:p>
+          <a:p>
+            <a:pPr lvl="2"/>
+            <a:r>
+              <a:rPr lang="en-US" dirty="0" smtClean="0"/>
+              <a:t>With JavaScript and Cascading Style Sheets (CSS)</a:t>
             </a:r>
           </a:p>
           <a:p>
             <a:pPr lvl="1"/>
             <a:r>
-              <a:rPr lang="en-US" dirty="0" smtClean="0"/>
-              <a:t>The basis of much of the World Wide Web we know today. </a:t>
-            </a:r>
+              <a:rPr lang="en-US" b="1" dirty="0" smtClean="0"/>
+              <a:t>XML:</a:t>
+            </a:r>
+            <a:r>
+              <a:rPr lang="en-US" dirty="0" smtClean="0"/>
+              <a:t> E</a:t>
+            </a:r>
+            <a:r>
+              <a:rPr lang="en-US" dirty="0"/>
+              <a:t>x</a:t>
+            </a:r>
+            <a:r>
+              <a:rPr lang="en-US" dirty="0" smtClean="0"/>
+              <a:t>tensible Markup Language</a:t>
+            </a:r>
+          </a:p>
+          <a:p>
+            <a:pPr lvl="1"/>
+            <a:r>
+              <a:rPr lang="en-US" b="1" dirty="0" smtClean="0"/>
+              <a:t>Web Services:</a:t>
+            </a:r>
+          </a:p>
+          <a:p>
+            <a:pPr lvl="2"/>
+            <a:r>
+              <a:rPr lang="en-US" b="1" dirty="0" smtClean="0"/>
+              <a:t>SOAP: </a:t>
+            </a:r>
+            <a:r>
+              <a:rPr lang="en-US" dirty="0"/>
+              <a:t>Simple Object Access Protocol</a:t>
+            </a:r>
+            <a:endParaRPr lang="en-US" dirty="0" smtClean="0"/>
+          </a:p>
+          <a:p>
+            <a:pPr lvl="2"/>
+            <a:r>
+              <a:rPr lang="en-US" b="1" dirty="0" err="1" smtClean="0"/>
+              <a:t>RESTful</a:t>
+            </a:r>
+            <a:r>
+              <a:rPr lang="en-US" b="1" dirty="0" smtClean="0"/>
+              <a:t> JSON: </a:t>
+            </a:r>
+            <a:r>
+              <a:rPr lang="en-US" dirty="0" smtClean="0"/>
+              <a:t>Representational State Transfer JavaScript Object Notation</a:t>
+            </a:r>
+          </a:p>
+          <a:p>
+            <a:pPr lvl="1"/>
+            <a:endParaRPr lang="en-US" dirty="0" smtClean="0"/>
+          </a:p>
+          <a:p>
+            <a:pPr lvl="1"/>
+            <a:endParaRPr lang="en-US" dirty="0" smtClean="0"/>
           </a:p>
           <a:p>
             <a:pPr lvl="1"/>
@@ -8651,13 +9963,20 @@
     </p:spTree>
     <p:extLst>
       <p:ext uri="{BB962C8B-B14F-4D97-AF65-F5344CB8AC3E}">
-        <p14:creationId xmlns:p14="http://schemas.microsoft.com/office/powerpoint/2010/main" val="1749294492"/>
+        <p14:creationId xmlns:p14="http://schemas.microsoft.com/office/powerpoint/2010/main" val="1033790560"/>
       </p:ext>
     </p:extLst>
   </p:cSld>
   <p:clrMapOvr>
     <a:masterClrMapping/>
   </p:clrMapOvr>
+  <p:timing>
+    <p:tnLst>
+      <p:par>
+        <p:cTn id="1" dur="indefinite" restart="never" nodeType="tmRoot"/>
+      </p:par>
+    </p:tnLst>
+  </p:timing>
 </p:sld>
 </file>
 
@@ -8716,20 +10035,112 @@
           <a:bodyPr/>
           <a:lstStyle/>
           <a:p>
-            <a:endParaRPr lang="en-US"/>
+            <a:r>
+              <a:rPr lang="en-US" dirty="0" smtClean="0"/>
+              <a:t>Hypertext Transfer Protocol (HTTP)</a:t>
+            </a:r>
+          </a:p>
+          <a:p>
+            <a:pPr lvl="1"/>
+            <a:r>
+              <a:rPr lang="en-US" dirty="0"/>
+              <a:t>Provides a simple dialect (verbs + structure) to ask for, give, and receive hypertext-based information</a:t>
+            </a:r>
+            <a:r>
+              <a:rPr lang="en-US" dirty="0" smtClean="0"/>
+              <a:t>.</a:t>
+            </a:r>
+            <a:endParaRPr lang="en-US" dirty="0" smtClean="0"/>
+          </a:p>
+          <a:p>
+            <a:pPr lvl="1"/>
+            <a:r>
+              <a:rPr lang="en-US" dirty="0" smtClean="0"/>
+              <a:t>Usually transferred using Transmission </a:t>
+            </a:r>
+            <a:r>
+              <a:rPr lang="en-US" dirty="0" smtClean="0"/>
+              <a:t>Control Protocol (TCP) </a:t>
+            </a:r>
+            <a:r>
+              <a:rPr lang="en-US" dirty="0" smtClean="0"/>
+              <a:t>over Internet </a:t>
+            </a:r>
+            <a:r>
+              <a:rPr lang="en-US" dirty="0" smtClean="0"/>
+              <a:t>Protocol (IP) </a:t>
+            </a:r>
+            <a:r>
+              <a:rPr lang="en-US" dirty="0" smtClean="0"/>
+              <a:t>switched networks</a:t>
+            </a:r>
+            <a:r>
+              <a:rPr lang="en-US" dirty="0" smtClean="0"/>
+              <a:t>.</a:t>
+            </a:r>
+          </a:p>
+          <a:p>
+            <a:pPr lvl="1"/>
+            <a:r>
+              <a:rPr lang="en-US" dirty="0" smtClean="0"/>
+              <a:t>Allows creation of a graph containing ‘hypertext’ vertices</a:t>
+            </a:r>
+            <a:r>
+              <a:rPr lang="en-US" dirty="0" smtClean="0"/>
+              <a:t> (nodes)</a:t>
+            </a:r>
+            <a:r>
+              <a:rPr lang="en-US" dirty="0" smtClean="0"/>
+              <a:t> linked across </a:t>
+            </a:r>
+            <a:r>
+              <a:rPr lang="en-US" dirty="0" smtClean="0"/>
+              <a:t>‘</a:t>
+            </a:r>
+            <a:r>
+              <a:rPr lang="en-US" dirty="0" smtClean="0"/>
+              <a:t>hyperlink’ arcs.</a:t>
+            </a:r>
+            <a:endParaRPr lang="en-US" dirty="0" smtClean="0"/>
+          </a:p>
+          <a:p>
+            <a:pPr lvl="1"/>
+            <a:r>
+              <a:rPr lang="en-US" dirty="0" smtClean="0"/>
+              <a:t>The basis of </a:t>
+            </a:r>
+            <a:r>
+              <a:rPr lang="en-US" dirty="0" smtClean="0"/>
+              <a:t>the World </a:t>
+            </a:r>
+            <a:r>
+              <a:rPr lang="en-US" dirty="0" smtClean="0"/>
+              <a:t>Wide Web we know </a:t>
+            </a:r>
+            <a:r>
+              <a:rPr lang="en-US" dirty="0" smtClean="0"/>
+              <a:t>today.</a:t>
+            </a:r>
           </a:p>
         </p:txBody>
       </p:sp>
     </p:spTree>
     <p:extLst>
       <p:ext uri="{BB962C8B-B14F-4D97-AF65-F5344CB8AC3E}">
-        <p14:creationId xmlns:p14="http://schemas.microsoft.com/office/powerpoint/2010/main" val="1437677408"/>
+        <p14:creationId xmlns:p14="http://schemas.microsoft.com/office/powerpoint/2010/main" val="1749294492"/>
       </p:ext>
     </p:extLst>
   </p:cSld>
   <p:clrMapOvr>
     <a:masterClrMapping/>
   </p:clrMapOvr>
+  <p:timing>
+    <p:tnLst>
+      <p:par>
+        <p:cTn id="1" dur="indefinite" restart="never" nodeType="tmRoot"/>
+      </p:par>
+    </p:tnLst>
+  </p:timing>
 </p:sld>
 </file>
 

</xml_diff>